<commit_message>
Milestone 1 Slides (Final)
</commit_message>
<xml_diff>
--- a/Milestone 01/IV Milestone 1.pptx
+++ b/Milestone 01/IV Milestone 1.pptx
@@ -1306,17 +1306,74 @@
           </a:bodyPr>
           <a:lstStyle/>
           <a:p>
-            <a:pPr indent="0" lvl="0" marL="0" rtl="0" algn="l">
-              <a:spcBef>
-                <a:spcPts val="0"/>
-              </a:spcBef>
-              <a:spcAft>
-                <a:spcPts val="0"/>
-              </a:spcAft>
-              <a:buNone/>
+            <a:pPr indent="-342900" lvl="0" marL="457200" rtl="0" algn="just">
+              <a:lnSpc>
+                <a:spcPct val="115000"/>
+              </a:lnSpc>
+              <a:spcBef>
+                <a:spcPts val="0"/>
+              </a:spcBef>
+              <a:spcAft>
+                <a:spcPts val="0"/>
+              </a:spcAft>
+              <a:buClr>
+                <a:srgbClr val="3F4252"/>
+              </a:buClr>
+              <a:buSzPts val="1800"/>
+              <a:buFont typeface="Nunito"/>
+              <a:buAutoNum type="arabicPeriod"/>
             </a:pPr>
             <a:r>
-              <a:t/>
+              <a:rPr lang="en" sz="1800">
+                <a:solidFill>
+                  <a:srgbClr val="3F4252"/>
+                </a:solidFill>
+                <a:latin typeface="Nunito"/>
+                <a:ea typeface="Nunito"/>
+                <a:cs typeface="Nunito"/>
+                <a:sym typeface="Nunito"/>
+              </a:rPr>
+              <a:t>Can the smallpox vaccine slow down the rate of infection/lower mortality rate ?</a:t>
+            </a:r>
+            <a:endParaRPr sz="1800">
+              <a:solidFill>
+                <a:srgbClr val="3F4252"/>
+              </a:solidFill>
+              <a:latin typeface="Nunito"/>
+              <a:ea typeface="Nunito"/>
+              <a:cs typeface="Nunito"/>
+              <a:sym typeface="Nunito"/>
+            </a:endParaRPr>
+          </a:p>
+          <a:p>
+            <a:pPr indent="-342900" lvl="0" marL="457200" rtl="0" algn="just">
+              <a:lnSpc>
+                <a:spcPct val="115000"/>
+              </a:lnSpc>
+              <a:spcBef>
+                <a:spcPts val="0"/>
+              </a:spcBef>
+              <a:spcAft>
+                <a:spcPts val="0"/>
+              </a:spcAft>
+              <a:buClr>
+                <a:srgbClr val="3F4252"/>
+              </a:buClr>
+              <a:buSzPts val="1800"/>
+              <a:buFont typeface="Nunito"/>
+              <a:buAutoNum type="arabicPeriod"/>
+            </a:pPr>
+            <a:r>
+              <a:rPr lang="en" sz="1800">
+                <a:solidFill>
+                  <a:srgbClr val="3F4252"/>
+                </a:solidFill>
+                <a:latin typeface="Nunito"/>
+                <a:ea typeface="Nunito"/>
+                <a:cs typeface="Nunito"/>
+                <a:sym typeface="Nunito"/>
+              </a:rPr>
+              <a:t>Does gender plays a role in the infection?</a:t>
             </a:r>
             <a:endParaRPr/>
           </a:p>
@@ -23768,8 +23825,8 @@
         </p:nvSpPr>
         <p:spPr>
           <a:xfrm>
-            <a:off x="458800" y="997525"/>
-            <a:ext cx="3102000" cy="1872600"/>
+            <a:off x="280550" y="1362725"/>
+            <a:ext cx="4265400" cy="3243000"/>
           </a:xfrm>
           <a:prstGeom prst="rect">
             <a:avLst/>
@@ -23814,24 +23871,7 @@
             </a:pPr>
             <a:r>
               <a:rPr lang="en" sz="1800"/>
-              <a:t>Can the smallpox vaccine slow down the rate of infection/lower mortality rate ?</a:t>
-            </a:r>
-            <a:endParaRPr sz="1800"/>
-          </a:p>
-          <a:p>
-            <a:pPr indent="-342900" lvl="0" marL="457200" rtl="0" algn="just">
-              <a:spcBef>
-                <a:spcPts val="0"/>
-              </a:spcBef>
-              <a:spcAft>
-                <a:spcPts val="0"/>
-              </a:spcAft>
-              <a:buSzPts val="1800"/>
-              <a:buAutoNum type="arabicPeriod"/>
-            </a:pPr>
-            <a:r>
-              <a:rPr lang="en" sz="1800"/>
-              <a:t>Does gender plays a role in the infection?</a:t>
+              <a:t>What are the specific countries that experience the outbreak </a:t>
             </a:r>
             <a:endParaRPr sz="1800"/>
           </a:p>
@@ -23847,7 +23887,22 @@
             </a:pPr>
             <a:r>
               <a:rPr lang="en" sz="1800"/>
-              <a:t>The representation of countries on a linear scale is misleading </a:t>
+              <a:t>The representation of countries on a linear scale is misleading.  </a:t>
+            </a:r>
+            <a:endParaRPr sz="1800"/>
+          </a:p>
+          <a:p>
+            <a:pPr indent="0" lvl="0" marL="0" rtl="0" algn="just">
+              <a:spcBef>
+                <a:spcPts val="1200"/>
+              </a:spcBef>
+              <a:spcAft>
+                <a:spcPts val="0"/>
+              </a:spcAft>
+              <a:buNone/>
+            </a:pPr>
+            <a:r>
+              <a:t/>
             </a:r>
             <a:endParaRPr sz="1800"/>
           </a:p>
@@ -23884,8 +23939,8 @@
         </p:blipFill>
         <p:spPr>
           <a:xfrm>
-            <a:off x="3822250" y="900288"/>
-            <a:ext cx="5106150" cy="3342933"/>
+            <a:off x="4663025" y="1450724"/>
+            <a:ext cx="4265376" cy="2792501"/>
           </a:xfrm>
           <a:prstGeom prst="rect">
             <a:avLst/>
@@ -29592,9 +29647,9 @@
 </file>
 
 <file path=ppt/theme/theme1.xml><?xml version="1.0" encoding="utf-8"?>
-<a:theme xmlns:a="http://schemas.openxmlformats.org/drawingml/2006/main" xmlns:r="http://schemas.openxmlformats.org/officeDocument/2006/relationships">
+<a:theme xmlns:a="http://schemas.openxmlformats.org/drawingml/2006/main" xmlns:r="http://schemas.openxmlformats.org/officeDocument/2006/relationships" name="Luxe">
   <a:themeElements>
-    <a:clrScheme name="Default">
+    <a:clrScheme name="Luxe">
       <a:dk1>
         <a:srgbClr val="000000"/>
       </a:dk1>
@@ -29602,34 +29657,34 @@
         <a:srgbClr val="FFFFFF"/>
       </a:lt1>
       <a:dk2>
-        <a:srgbClr val="158158"/>
+        <a:srgbClr val="B7B7B7"/>
       </a:dk2>
       <a:lt2>
-        <a:srgbClr val="F3F3F3"/>
+        <a:srgbClr val="CCA677"/>
       </a:lt2>
       <a:accent1>
-        <a:srgbClr val="058DC7"/>
+        <a:srgbClr val="5D4037"/>
       </a:accent1>
       <a:accent2>
-        <a:srgbClr val="50B432"/>
+        <a:srgbClr val="455A64"/>
       </a:accent2>
       <a:accent3>
-        <a:srgbClr val="ED561B"/>
+        <a:srgbClr val="57BB8A"/>
       </a:accent3>
       <a:accent4>
-        <a:srgbClr val="EDEF00"/>
+        <a:srgbClr val="78909C"/>
       </a:accent4>
       <a:accent5>
-        <a:srgbClr val="24CBE5"/>
+        <a:srgbClr val="607D8B"/>
       </a:accent5>
       <a:accent6>
-        <a:srgbClr val="64E572"/>
+        <a:srgbClr val="DCE755"/>
       </a:accent6>
       <a:hlink>
-        <a:srgbClr val="2200CC"/>
+        <a:srgbClr val="607D8B"/>
       </a:hlink>
       <a:folHlink>
-        <a:srgbClr val="551A8B"/>
+        <a:srgbClr val="607D8B"/>
       </a:folHlink>
     </a:clrScheme>
     <a:fontScheme name="Office">
@@ -29871,9 +29926,9 @@
 </file>
 
 <file path=ppt/theme/theme2.xml><?xml version="1.0" encoding="utf-8"?>
-<a:theme xmlns:a="http://schemas.openxmlformats.org/drawingml/2006/main" xmlns:r="http://schemas.openxmlformats.org/officeDocument/2006/relationships" name="Luxe">
+<a:theme xmlns:a="http://schemas.openxmlformats.org/drawingml/2006/main" xmlns:r="http://schemas.openxmlformats.org/officeDocument/2006/relationships">
   <a:themeElements>
-    <a:clrScheme name="Luxe">
+    <a:clrScheme name="Default">
       <a:dk1>
         <a:srgbClr val="000000"/>
       </a:dk1>
@@ -29881,34 +29936,34 @@
         <a:srgbClr val="FFFFFF"/>
       </a:lt1>
       <a:dk2>
-        <a:srgbClr val="B7B7B7"/>
+        <a:srgbClr val="158158"/>
       </a:dk2>
       <a:lt2>
-        <a:srgbClr val="CCA677"/>
+        <a:srgbClr val="F3F3F3"/>
       </a:lt2>
       <a:accent1>
-        <a:srgbClr val="5D4037"/>
+        <a:srgbClr val="058DC7"/>
       </a:accent1>
       <a:accent2>
-        <a:srgbClr val="455A64"/>
+        <a:srgbClr val="50B432"/>
       </a:accent2>
       <a:accent3>
-        <a:srgbClr val="57BB8A"/>
+        <a:srgbClr val="ED561B"/>
       </a:accent3>
       <a:accent4>
-        <a:srgbClr val="78909C"/>
+        <a:srgbClr val="EDEF00"/>
       </a:accent4>
       <a:accent5>
-        <a:srgbClr val="607D8B"/>
+        <a:srgbClr val="24CBE5"/>
       </a:accent5>
       <a:accent6>
-        <a:srgbClr val="DCE755"/>
+        <a:srgbClr val="64E572"/>
       </a:accent6>
       <a:hlink>
-        <a:srgbClr val="607D8B"/>
+        <a:srgbClr val="2200CC"/>
       </a:hlink>
       <a:folHlink>
-        <a:srgbClr val="607D8B"/>
+        <a:srgbClr val="551A8B"/>
       </a:folHlink>
     </a:clrScheme>
     <a:fontScheme name="Office">

</xml_diff>